<commit_message>
bdd talk changes. NHibernate talk included.
</commit_message>
<xml_diff>
--- a/BDD From The Trenches/BDD.pptx
+++ b/BDD From The Trenches/BDD.pptx
@@ -277,7 +277,7 @@
               <a:pPr>
                 <a:defRPr/>
               </a:pPr>
-              <a:t>4/1/2011</a:t>
+              <a:t>4/30/2011</a:t>
             </a:fld>
             <a:endParaRPr lang="en-US"/>
           </a:p>
@@ -496,7 +496,7 @@
               <a:pPr>
                 <a:defRPr/>
               </a:pPr>
-              <a:t>4/1/2011</a:t>
+              <a:t>4/30/2011</a:t>
             </a:fld>
             <a:endParaRPr lang="en-US"/>
           </a:p>
@@ -3694,7 +3694,7 @@
               <a:pPr>
                 <a:defRPr/>
               </a:pPr>
-              <a:t>4/1/2011</a:t>
+              <a:t>4/30/2011</a:t>
             </a:fld>
             <a:endParaRPr lang="en-US"/>
           </a:p>
@@ -3969,7 +3969,7 @@
           <a:p>
             <a:fld id="{25F5498A-9B7B-479F-94C6-76B8E5705143}" type="datetimeFigureOut">
               <a:rPr lang="en-US" smtClean="0"/>
-              <a:t>4/1/2011</a:t>
+              <a:t>4/30/2011</a:t>
             </a:fld>
             <a:endParaRPr lang="en-US"/>
           </a:p>
@@ -4146,7 +4146,7 @@
           <a:p>
             <a:fld id="{25F5498A-9B7B-479F-94C6-76B8E5705143}" type="datetimeFigureOut">
               <a:rPr lang="en-US" smtClean="0"/>
-              <a:t>4/1/2011</a:t>
+              <a:t>4/30/2011</a:t>
             </a:fld>
             <a:endParaRPr lang="en-US"/>
           </a:p>
@@ -4405,7 +4405,7 @@
               <a:pPr>
                 <a:defRPr/>
               </a:pPr>
-              <a:t>4/1/2011</a:t>
+              <a:t>4/30/2011</a:t>
             </a:fld>
             <a:endParaRPr lang="en-US"/>
           </a:p>
@@ -4712,7 +4712,7 @@
           <a:p>
             <a:fld id="{25F5498A-9B7B-479F-94C6-76B8E5705143}" type="datetimeFigureOut">
               <a:rPr lang="en-US" smtClean="0"/>
-              <a:t>4/1/2011</a:t>
+              <a:t>4/30/2011</a:t>
             </a:fld>
             <a:endParaRPr lang="en-US"/>
           </a:p>
@@ -5141,7 +5141,7 @@
           <a:p>
             <a:fld id="{25F5498A-9B7B-479F-94C6-76B8E5705143}" type="datetimeFigureOut">
               <a:rPr lang="en-US" smtClean="0"/>
-              <a:t>4/1/2011</a:t>
+              <a:t>4/30/2011</a:t>
             </a:fld>
             <a:endParaRPr lang="en-US"/>
           </a:p>
@@ -5266,7 +5266,7 @@
           <a:p>
             <a:fld id="{25F5498A-9B7B-479F-94C6-76B8E5705143}" type="datetimeFigureOut">
               <a:rPr lang="en-US" smtClean="0"/>
-              <a:t>4/1/2011</a:t>
+              <a:t>4/30/2011</a:t>
             </a:fld>
             <a:endParaRPr lang="en-US"/>
           </a:p>
@@ -5368,7 +5368,7 @@
           <a:p>
             <a:fld id="{25F5498A-9B7B-479F-94C6-76B8E5705143}" type="datetimeFigureOut">
               <a:rPr lang="en-US" smtClean="0"/>
-              <a:t>4/1/2011</a:t>
+              <a:t>4/30/2011</a:t>
             </a:fld>
             <a:endParaRPr lang="en-US"/>
           </a:p>
@@ -5655,7 +5655,7 @@
           <a:p>
             <a:fld id="{25F5498A-9B7B-479F-94C6-76B8E5705143}" type="datetimeFigureOut">
               <a:rPr lang="en-US" smtClean="0"/>
-              <a:t>4/1/2011</a:t>
+              <a:t>4/30/2011</a:t>
             </a:fld>
             <a:endParaRPr lang="en-US"/>
           </a:p>
@@ -5915,7 +5915,7 @@
           <a:p>
             <a:fld id="{25F5498A-9B7B-479F-94C6-76B8E5705143}" type="datetimeFigureOut">
               <a:rPr lang="en-US" smtClean="0"/>
-              <a:t>4/1/2011</a:t>
+              <a:t>4/30/2011</a:t>
             </a:fld>
             <a:endParaRPr lang="en-US"/>
           </a:p>
@@ -6243,7 +6243,7 @@
           <a:p>
             <a:fld id="{25F5498A-9B7B-479F-94C6-76B8E5705143}" type="datetimeFigureOut">
               <a:rPr lang="en-US" smtClean="0"/>
-              <a:t>4/1/2011</a:t>
+              <a:t>4/30/2011</a:t>
             </a:fld>
             <a:endParaRPr lang="en-US"/>
           </a:p>
@@ -6430,7 +6430,7 @@
           <a:p>
             <a:fld id="{25F5498A-9B7B-479F-94C6-76B8E5705143}" type="datetimeFigureOut">
               <a:rPr lang="en-US" smtClean="0"/>
-              <a:t>4/1/2011</a:t>
+              <a:t>4/30/2011</a:t>
             </a:fld>
             <a:endParaRPr lang="en-US"/>
           </a:p>
@@ -7442,7 +7442,7 @@
               <a:pPr>
                 <a:defRPr/>
               </a:pPr>
-              <a:t>4/1/2011</a:t>
+              <a:t>4/30/2011</a:t>
             </a:fld>
             <a:endParaRPr lang="en-US"/>
           </a:p>
@@ -8229,7 +8229,7 @@
           <a:p>
             <a:fld id="{25F5498A-9B7B-479F-94C6-76B8E5705143}" type="datetimeFigureOut">
               <a:rPr lang="en-US" smtClean="0"/>
-              <a:t>4/1/2011</a:t>
+              <a:t>4/30/2011</a:t>
             </a:fld>
             <a:endParaRPr lang="en-US"/>
           </a:p>
@@ -8661,8 +8661,8 @@
         </p:nvSpPr>
         <p:spPr bwMode="auto">
           <a:xfrm>
-            <a:off x="5567363" y="2828925"/>
-            <a:ext cx="3195637" cy="523875"/>
+            <a:off x="5445104" y="3733800"/>
+            <a:ext cx="3317896" cy="523220"/>
           </a:xfrm>
           <a:prstGeom prst="rect">
             <a:avLst/>
@@ -8690,9 +8690,10 @@
           <a:p>
             <a:pPr algn="r"/>
             <a:r>
-              <a:rPr lang="en-US" sz="2800" dirty="0"/>
-              <a:t>Getting Started With</a:t>
-            </a:r>
+              <a:rPr lang="en-US" sz="2800" dirty="0" smtClean="0"/>
+              <a:t>From The Trenches</a:t>
+            </a:r>
+            <a:endParaRPr lang="en-US" sz="2800" dirty="0"/>
           </a:p>
         </p:txBody>
       </p:sp>
@@ -9805,6 +9806,13 @@
   <p:transition>
     <p:fade thruBlk="1"/>
   </p:transition>
+  <p:timing>
+    <p:tnLst>
+      <p:par>
+        <p:cTn id="1" dur="indefinite" restart="never" nodeType="tmRoot"/>
+      </p:par>
+    </p:tnLst>
+  </p:timing>
 </p:sld>
 </file>
 
@@ -10291,7 +10299,6 @@
               <a:rPr lang="en-US" dirty="0" smtClean="0"/>
               <a:t>Consultant</a:t>
             </a:r>
-            <a:endParaRPr lang="en-US" dirty="0" smtClean="0"/>
           </a:p>
           <a:p>
             <a:r>

</xml_diff>